<commit_message>
apnic blog as submitted
</commit_message>
<xml_diff>
--- a/imc17-pto-poster/imc17-pto-poster.pptx
+++ b/imc17-pto-poster/imc17-pto-poster.pptx
@@ -2083,7 +2083,7 @@
         <p:spPr>
           <a:xfrm>
             <a:off x="666000" y="17407800"/>
-            <a:ext cx="14095029" cy="2632259"/>
+            <a:ext cx="14095029" cy="1569660"/>
           </a:xfrm>
           <a:prstGeom prst="rect">
             <a:avLst/>
@@ -2167,20 +2167,17 @@
                 <a:ea typeface="Helvetica Neue" charset="0"/>
                 <a:cs typeface="Helvetica Neue" charset="0"/>
               </a:rPr>
-              <a:t>held:</a:t>
-            </a:r>
-          </a:p>
-          <a:p>
-            <a:pPr algn="ctr"/>
-            <a:r>
-              <a:rPr lang="en-US" b="1" i="1" dirty="0" smtClean="0">
-                <a:latin typeface="Helvetica Neue" charset="0"/>
-                <a:ea typeface="Helvetica Neue" charset="0"/>
-                <a:cs typeface="Helvetica Neue" charset="0"/>
-              </a:rPr>
-              <a:t>O = {t, p, c}</a:t>
-            </a:r>
-            <a:endParaRPr lang="en-US" b="1" i="1" dirty="0">
+              <a:t>held</a:t>
+            </a:r>
+            <a:r>
+              <a:rPr lang="en-US" sz="4800" dirty="0" smtClean="0">
+                <a:latin typeface="Helvetica Neue" charset="0"/>
+                <a:ea typeface="Helvetica Neue" charset="0"/>
+                <a:cs typeface="Helvetica Neue" charset="0"/>
+              </a:rPr>
+              <a:t>:</a:t>
+            </a:r>
+            <a:endParaRPr lang="en-US" sz="4800" dirty="0" smtClean="0">
               <a:latin typeface="Helvetica Neue" charset="0"/>
               <a:ea typeface="Helvetica Neue" charset="0"/>
               <a:cs typeface="Helvetica Neue" charset="0"/>
@@ -2819,6 +2816,44 @@
               <a:t> </a:t>
             </a:r>
             <a:endParaRPr lang="en-US" sz="4400" b="1" dirty="0">
+              <a:latin typeface="Helvetica Neue" charset="0"/>
+              <a:ea typeface="Helvetica Neue" charset="0"/>
+              <a:cs typeface="Helvetica Neue" charset="0"/>
+            </a:endParaRPr>
+          </a:p>
+        </p:txBody>
+      </p:sp>
+      <p:sp>
+        <p:nvSpPr>
+          <p:cNvPr id="3" name="Rectangle 2"/>
+          <p:cNvSpPr/>
+          <p:nvPr/>
+        </p:nvSpPr>
+        <p:spPr>
+          <a:xfrm>
+            <a:off x="5121365" y="19213681"/>
+            <a:ext cx="4836580" cy="1154932"/>
+          </a:xfrm>
+          <a:prstGeom prst="rect">
+            <a:avLst/>
+          </a:prstGeom>
+        </p:spPr>
+        <p:txBody>
+          <a:bodyPr wrap="none">
+            <a:spAutoFit/>
+          </a:bodyPr>
+          <a:lstStyle/>
+          <a:p>
+            <a:pPr algn="ctr"/>
+            <a:r>
+              <a:rPr lang="en-US" b="1" i="1">
+                <a:latin typeface="Helvetica Neue" charset="0"/>
+                <a:ea typeface="Helvetica Neue" charset="0"/>
+                <a:cs typeface="Helvetica Neue" charset="0"/>
+              </a:rPr>
+              <a:t>O = {t, p, c}</a:t>
+            </a:r>
+            <a:endParaRPr lang="en-US" b="1" i="1" dirty="0">
               <a:latin typeface="Helvetica Neue" charset="0"/>
               <a:ea typeface="Helvetica Neue" charset="0"/>
               <a:cs typeface="Helvetica Neue" charset="0"/>

</xml_diff>